<commit_message>
modified BL-02 retry description due to AdminConnectionRetryInterceptor addition #157
</commit_message>
<xml_diff>
--- a/function/素材/BL-02 非同期型ジョブ実行機能(リトライの図).pptx
+++ b/function/素材/BL-02 非同期型ジョブ実行機能(リトライの図).pptx
@@ -104,6 +104,22 @@
       </a:defRPr>
     </a:lvl9pPr>
   </p:defaultTextStyle>
+  <p:extLst>
+    <p:ext uri="{EFAFB233-063F-42B5-8137-9DF3F51BA10A}">
+      <p15:sldGuideLst xmlns:p15="http://schemas.microsoft.com/office/powerpoint/2012/main">
+        <p15:guide id="1" orient="horz" pos="2880">
+          <p15:clr>
+            <a:srgbClr val="A4A3A4"/>
+          </p15:clr>
+        </p15:guide>
+        <p15:guide id="2" pos="2160">
+          <p15:clr>
+            <a:srgbClr val="A4A3A4"/>
+          </p15:clr>
+        </p15:guide>
+      </p15:sldGuideLst>
+    </p:ext>
+  </p:extLst>
 </p:presentation>
 </file>
 
@@ -289,7 +305,7 @@
             <a:fld id="{E90ED720-0104-4369-84BC-D37694168613}" type="datetimeFigureOut">
               <a:rPr kumimoji="1" lang="ja-JP" altLang="en-US" smtClean="0"/>
               <a:pPr/>
-              <a:t>2011/10/26</a:t>
+              <a:t>2015/12/18</a:t>
             </a:fld>
             <a:endParaRPr kumimoji="1" lang="ja-JP" altLang="en-US"/>
           </a:p>
@@ -332,7 +348,7 @@
             <a:fld id="{D2D8002D-B5B0-4BAC-B1F6-782DDCCE6D9C}" type="slidenum">
               <a:rPr kumimoji="1" lang="ja-JP" altLang="en-US" smtClean="0"/>
               <a:pPr/>
-              <a:t>&lt;#&gt;</a:t>
+              <a:t>‹#›</a:t>
             </a:fld>
             <a:endParaRPr kumimoji="1" lang="ja-JP" altLang="en-US"/>
           </a:p>
@@ -488,7 +504,7 @@
             <a:fld id="{E90ED720-0104-4369-84BC-D37694168613}" type="datetimeFigureOut">
               <a:rPr kumimoji="1" lang="ja-JP" altLang="en-US" smtClean="0"/>
               <a:pPr/>
-              <a:t>2011/10/26</a:t>
+              <a:t>2015/12/18</a:t>
             </a:fld>
             <a:endParaRPr kumimoji="1" lang="ja-JP" altLang="en-US"/>
           </a:p>
@@ -531,7 +547,7 @@
             <a:fld id="{D2D8002D-B5B0-4BAC-B1F6-782DDCCE6D9C}" type="slidenum">
               <a:rPr kumimoji="1" lang="ja-JP" altLang="en-US" smtClean="0"/>
               <a:pPr/>
-              <a:t>&lt;#&gt;</a:t>
+              <a:t>‹#›</a:t>
             </a:fld>
             <a:endParaRPr kumimoji="1" lang="ja-JP" altLang="en-US"/>
           </a:p>
@@ -697,7 +713,7 @@
             <a:fld id="{E90ED720-0104-4369-84BC-D37694168613}" type="datetimeFigureOut">
               <a:rPr kumimoji="1" lang="ja-JP" altLang="en-US" smtClean="0"/>
               <a:pPr/>
-              <a:t>2011/10/26</a:t>
+              <a:t>2015/12/18</a:t>
             </a:fld>
             <a:endParaRPr kumimoji="1" lang="ja-JP" altLang="en-US"/>
           </a:p>
@@ -740,7 +756,7 @@
             <a:fld id="{D2D8002D-B5B0-4BAC-B1F6-782DDCCE6D9C}" type="slidenum">
               <a:rPr kumimoji="1" lang="ja-JP" altLang="en-US" smtClean="0"/>
               <a:pPr/>
-              <a:t>&lt;#&gt;</a:t>
+              <a:t>‹#›</a:t>
             </a:fld>
             <a:endParaRPr kumimoji="1" lang="ja-JP" altLang="en-US"/>
           </a:p>
@@ -896,7 +912,7 @@
             <a:fld id="{E90ED720-0104-4369-84BC-D37694168613}" type="datetimeFigureOut">
               <a:rPr kumimoji="1" lang="ja-JP" altLang="en-US" smtClean="0"/>
               <a:pPr/>
-              <a:t>2011/10/26</a:t>
+              <a:t>2015/12/18</a:t>
             </a:fld>
             <a:endParaRPr kumimoji="1" lang="ja-JP" altLang="en-US"/>
           </a:p>
@@ -939,7 +955,7 @@
             <a:fld id="{D2D8002D-B5B0-4BAC-B1F6-782DDCCE6D9C}" type="slidenum">
               <a:rPr kumimoji="1" lang="ja-JP" altLang="en-US" smtClean="0"/>
               <a:pPr/>
-              <a:t>&lt;#&gt;</a:t>
+              <a:t>‹#›</a:t>
             </a:fld>
             <a:endParaRPr kumimoji="1" lang="ja-JP" altLang="en-US"/>
           </a:p>
@@ -1139,7 +1155,7 @@
             <a:fld id="{E90ED720-0104-4369-84BC-D37694168613}" type="datetimeFigureOut">
               <a:rPr kumimoji="1" lang="ja-JP" altLang="en-US" smtClean="0"/>
               <a:pPr/>
-              <a:t>2011/10/26</a:t>
+              <a:t>2015/12/18</a:t>
             </a:fld>
             <a:endParaRPr kumimoji="1" lang="ja-JP" altLang="en-US"/>
           </a:p>
@@ -1182,7 +1198,7 @@
             <a:fld id="{D2D8002D-B5B0-4BAC-B1F6-782DDCCE6D9C}" type="slidenum">
               <a:rPr kumimoji="1" lang="ja-JP" altLang="en-US" smtClean="0"/>
               <a:pPr/>
-              <a:t>&lt;#&gt;</a:t>
+              <a:t>‹#›</a:t>
             </a:fld>
             <a:endParaRPr kumimoji="1" lang="ja-JP" altLang="en-US"/>
           </a:p>
@@ -1488,7 +1504,7 @@
             <a:fld id="{E90ED720-0104-4369-84BC-D37694168613}" type="datetimeFigureOut">
               <a:rPr kumimoji="1" lang="ja-JP" altLang="en-US" smtClean="0"/>
               <a:pPr/>
-              <a:t>2011/10/26</a:t>
+              <a:t>2015/12/18</a:t>
             </a:fld>
             <a:endParaRPr kumimoji="1" lang="ja-JP" altLang="en-US"/>
           </a:p>
@@ -1531,7 +1547,7 @@
             <a:fld id="{D2D8002D-B5B0-4BAC-B1F6-782DDCCE6D9C}" type="slidenum">
               <a:rPr kumimoji="1" lang="ja-JP" altLang="en-US" smtClean="0"/>
               <a:pPr/>
-              <a:t>&lt;#&gt;</a:t>
+              <a:t>‹#›</a:t>
             </a:fld>
             <a:endParaRPr kumimoji="1" lang="ja-JP" altLang="en-US"/>
           </a:p>
@@ -1971,7 +1987,7 @@
             <a:fld id="{E90ED720-0104-4369-84BC-D37694168613}" type="datetimeFigureOut">
               <a:rPr kumimoji="1" lang="ja-JP" altLang="en-US" smtClean="0"/>
               <a:pPr/>
-              <a:t>2011/10/26</a:t>
+              <a:t>2015/12/18</a:t>
             </a:fld>
             <a:endParaRPr kumimoji="1" lang="ja-JP" altLang="en-US"/>
           </a:p>
@@ -2014,7 +2030,7 @@
             <a:fld id="{D2D8002D-B5B0-4BAC-B1F6-782DDCCE6D9C}" type="slidenum">
               <a:rPr kumimoji="1" lang="ja-JP" altLang="en-US" smtClean="0"/>
               <a:pPr/>
-              <a:t>&lt;#&gt;</a:t>
+              <a:t>‹#›</a:t>
             </a:fld>
             <a:endParaRPr kumimoji="1" lang="ja-JP" altLang="en-US"/>
           </a:p>
@@ -2086,7 +2102,7 @@
             <a:fld id="{E90ED720-0104-4369-84BC-D37694168613}" type="datetimeFigureOut">
               <a:rPr kumimoji="1" lang="ja-JP" altLang="en-US" smtClean="0"/>
               <a:pPr/>
-              <a:t>2011/10/26</a:t>
+              <a:t>2015/12/18</a:t>
             </a:fld>
             <a:endParaRPr kumimoji="1" lang="ja-JP" altLang="en-US"/>
           </a:p>
@@ -2129,7 +2145,7 @@
             <a:fld id="{D2D8002D-B5B0-4BAC-B1F6-782DDCCE6D9C}" type="slidenum">
               <a:rPr kumimoji="1" lang="ja-JP" altLang="en-US" smtClean="0"/>
               <a:pPr/>
-              <a:t>&lt;#&gt;</a:t>
+              <a:t>‹#›</a:t>
             </a:fld>
             <a:endParaRPr kumimoji="1" lang="ja-JP" altLang="en-US"/>
           </a:p>
@@ -2178,7 +2194,7 @@
             <a:fld id="{E90ED720-0104-4369-84BC-D37694168613}" type="datetimeFigureOut">
               <a:rPr kumimoji="1" lang="ja-JP" altLang="en-US" smtClean="0"/>
               <a:pPr/>
-              <a:t>2011/10/26</a:t>
+              <a:t>2015/12/18</a:t>
             </a:fld>
             <a:endParaRPr kumimoji="1" lang="ja-JP" altLang="en-US"/>
           </a:p>
@@ -2221,7 +2237,7 @@
             <a:fld id="{D2D8002D-B5B0-4BAC-B1F6-782DDCCE6D9C}" type="slidenum">
               <a:rPr kumimoji="1" lang="ja-JP" altLang="en-US" smtClean="0"/>
               <a:pPr/>
-              <a:t>&lt;#&gt;</a:t>
+              <a:t>‹#›</a:t>
             </a:fld>
             <a:endParaRPr kumimoji="1" lang="ja-JP" altLang="en-US"/>
           </a:p>
@@ -2484,7 +2500,7 @@
             <a:fld id="{E90ED720-0104-4369-84BC-D37694168613}" type="datetimeFigureOut">
               <a:rPr kumimoji="1" lang="ja-JP" altLang="en-US" smtClean="0"/>
               <a:pPr/>
-              <a:t>2011/10/26</a:t>
+              <a:t>2015/12/18</a:t>
             </a:fld>
             <a:endParaRPr kumimoji="1" lang="ja-JP" altLang="en-US"/>
           </a:p>
@@ -2527,7 +2543,7 @@
             <a:fld id="{D2D8002D-B5B0-4BAC-B1F6-782DDCCE6D9C}" type="slidenum">
               <a:rPr kumimoji="1" lang="ja-JP" altLang="en-US" smtClean="0"/>
               <a:pPr/>
-              <a:t>&lt;#&gt;</a:t>
+              <a:t>‹#›</a:t>
             </a:fld>
             <a:endParaRPr kumimoji="1" lang="ja-JP" altLang="en-US"/>
           </a:p>
@@ -2734,7 +2750,7 @@
             <a:fld id="{E90ED720-0104-4369-84BC-D37694168613}" type="datetimeFigureOut">
               <a:rPr kumimoji="1" lang="ja-JP" altLang="en-US" smtClean="0"/>
               <a:pPr/>
-              <a:t>2011/10/26</a:t>
+              <a:t>2015/12/18</a:t>
             </a:fld>
             <a:endParaRPr kumimoji="1" lang="ja-JP" altLang="en-US"/>
           </a:p>
@@ -2777,7 +2793,7 @@
             <a:fld id="{D2D8002D-B5B0-4BAC-B1F6-782DDCCE6D9C}" type="slidenum">
               <a:rPr kumimoji="1" lang="ja-JP" altLang="en-US" smtClean="0"/>
               <a:pPr/>
-              <a:t>&lt;#&gt;</a:t>
+              <a:t>‹#›</a:t>
             </a:fld>
             <a:endParaRPr kumimoji="1" lang="ja-JP" altLang="en-US"/>
           </a:p>
@@ -2976,7 +2992,7 @@
             <a:fld id="{E90ED720-0104-4369-84BC-D37694168613}" type="datetimeFigureOut">
               <a:rPr kumimoji="1" lang="ja-JP" altLang="en-US" smtClean="0"/>
               <a:pPr/>
-              <a:t>2011/10/26</a:t>
+              <a:t>2015/12/18</a:t>
             </a:fld>
             <a:endParaRPr kumimoji="1" lang="ja-JP" altLang="en-US"/>
           </a:p>
@@ -3055,7 +3071,7 @@
             <a:fld id="{D2D8002D-B5B0-4BAC-B1F6-782DDCCE6D9C}" type="slidenum">
               <a:rPr kumimoji="1" lang="ja-JP" altLang="en-US" smtClean="0"/>
               <a:pPr/>
-              <a:t>&lt;#&gt;</a:t>
+              <a:t>‹#›</a:t>
             </a:fld>
             <a:endParaRPr kumimoji="1" lang="ja-JP" altLang="en-US"/>
           </a:p>
@@ -3538,7 +3554,31 @@
                     <a:schemeClr val="tx1"/>
                   </a:solidFill>
                 </a:rPr>
-                <a:t>AsyncBatchExecutor</a:t>
+                <a:t>JobControlFinder</a:t>
+              </a:r>
+              <a:endParaRPr kumimoji="1" lang="en-US" altLang="ja-JP" sz="1200" dirty="0" smtClean="0">
+                <a:solidFill>
+                  <a:schemeClr val="tx1"/>
+                </a:solidFill>
+              </a:endParaRPr>
+            </a:p>
+            <a:p>
+              <a:pPr algn="ctr"/>
+              <a:r>
+                <a:rPr lang="en-US" altLang="ja-JP" sz="1200" dirty="0" err="1" smtClean="0">
+                  <a:solidFill>
+                    <a:schemeClr val="tx1"/>
+                  </a:solidFill>
+                </a:rPr>
+                <a:t>JobStatusChange</a:t>
+              </a:r>
+              <a:r>
+                <a:rPr lang="en-US" altLang="ja-JP" sz="1200" dirty="0" err="1">
+                  <a:solidFill>
+                    <a:schemeClr val="tx1"/>
+                  </a:solidFill>
+                </a:rPr>
+                <a:t>r</a:t>
               </a:r>
               <a:endParaRPr kumimoji="1" lang="ja-JP" altLang="en-US" sz="1200" dirty="0">
                 <a:solidFill>
@@ -3895,14 +3935,30 @@
             <a:p>
               <a:pPr algn="ctr"/>
               <a:r>
-                <a:rPr kumimoji="1" lang="en-US" altLang="ja-JP" sz="1200" dirty="0" err="1" smtClean="0">
+                <a:rPr lang="en-US" altLang="ja-JP" sz="1200" dirty="0" err="1">
                   <a:solidFill>
                     <a:schemeClr val="tx1"/>
                   </a:solidFill>
                 </a:rPr>
-                <a:t>AsyncBatchExecutor</a:t>
+                <a:t>JobControlFinder</a:t>
               </a:r>
-              <a:endParaRPr kumimoji="1" lang="ja-JP" altLang="en-US" sz="1200" dirty="0">
+              <a:endParaRPr lang="en-US" altLang="ja-JP" sz="1200" dirty="0">
+                <a:solidFill>
+                  <a:schemeClr val="tx1"/>
+                </a:solidFill>
+              </a:endParaRPr>
+            </a:p>
+            <a:p>
+              <a:pPr algn="ctr"/>
+              <a:r>
+                <a:rPr lang="en-US" altLang="ja-JP" sz="1200" dirty="0" err="1">
+                  <a:solidFill>
+                    <a:schemeClr val="tx1"/>
+                  </a:solidFill>
+                </a:rPr>
+                <a:t>JobStatusChanger</a:t>
+              </a:r>
+              <a:endParaRPr lang="ja-JP" altLang="en-US" sz="1200" dirty="0">
                 <a:solidFill>
                   <a:schemeClr val="tx1"/>
                 </a:solidFill>
@@ -4237,14 +4293,30 @@
             <a:p>
               <a:pPr algn="ctr"/>
               <a:r>
-                <a:rPr kumimoji="1" lang="en-US" altLang="ja-JP" sz="1200" dirty="0" err="1" smtClean="0">
+                <a:rPr lang="en-US" altLang="ja-JP" sz="1200" dirty="0" err="1">
                   <a:solidFill>
                     <a:schemeClr val="tx1"/>
                   </a:solidFill>
                 </a:rPr>
-                <a:t>AsyncBatchExecutor</a:t>
+                <a:t>JobControlFinder</a:t>
               </a:r>
-              <a:endParaRPr kumimoji="1" lang="ja-JP" altLang="en-US" sz="1200" dirty="0">
+              <a:endParaRPr lang="en-US" altLang="ja-JP" sz="1200" dirty="0">
+                <a:solidFill>
+                  <a:schemeClr val="tx1"/>
+                </a:solidFill>
+              </a:endParaRPr>
+            </a:p>
+            <a:p>
+              <a:pPr algn="ctr"/>
+              <a:r>
+                <a:rPr lang="en-US" altLang="ja-JP" sz="1200" dirty="0" err="1">
+                  <a:solidFill>
+                    <a:schemeClr val="tx1"/>
+                  </a:solidFill>
+                </a:rPr>
+                <a:t>JobStatusChanger</a:t>
+              </a:r>
+              <a:endParaRPr lang="ja-JP" altLang="en-US" sz="1200" dirty="0">
                 <a:solidFill>
                   <a:schemeClr val="tx1"/>
                 </a:solidFill>
@@ -4835,14 +4907,30 @@
             <a:p>
               <a:pPr algn="ctr"/>
               <a:r>
-                <a:rPr kumimoji="1" lang="en-US" altLang="ja-JP" sz="1200" dirty="0" err="1" smtClean="0">
+                <a:rPr lang="en-US" altLang="ja-JP" sz="1200" dirty="0" err="1">
                   <a:solidFill>
                     <a:schemeClr val="tx1"/>
                   </a:solidFill>
                 </a:rPr>
-                <a:t>AsyncBatchExecutor</a:t>
+                <a:t>JobControlFinder</a:t>
               </a:r>
-              <a:endParaRPr kumimoji="1" lang="ja-JP" altLang="en-US" sz="1200" dirty="0">
+              <a:endParaRPr lang="en-US" altLang="ja-JP" sz="1200" dirty="0">
+                <a:solidFill>
+                  <a:schemeClr val="tx1"/>
+                </a:solidFill>
+              </a:endParaRPr>
+            </a:p>
+            <a:p>
+              <a:pPr algn="ctr"/>
+              <a:r>
+                <a:rPr lang="en-US" altLang="ja-JP" sz="1200" dirty="0" err="1">
+                  <a:solidFill>
+                    <a:schemeClr val="tx1"/>
+                  </a:solidFill>
+                </a:rPr>
+                <a:t>JobStatusChanger</a:t>
+              </a:r>
+              <a:endParaRPr lang="ja-JP" altLang="en-US" sz="1200" dirty="0">
                 <a:solidFill>
                   <a:schemeClr val="tx1"/>
                 </a:solidFill>

</xml_diff>

<commit_message>
fixed AdminConnectionRetryInterceptor description #160
</commit_message>
<xml_diff>
--- a/function/素材/BL-02 非同期型ジョブ実行機能(リトライの図).pptx
+++ b/function/素材/BL-02 非同期型ジョブ実行機能(リトライの図).pptx
@@ -106,7 +106,7 @@
   </p:defaultTextStyle>
   <p:extLst>
     <p:ext uri="{EFAFB233-063F-42B5-8137-9DF3F51BA10A}">
-      <p15:sldGuideLst xmlns:p15="http://schemas.microsoft.com/office/powerpoint/2012/main">
+      <p15:sldGuideLst xmlns:p15="http://schemas.microsoft.com/office/powerpoint/2012/main" xmlns="">
         <p15:guide id="1" orient="horz" pos="2880">
           <p15:clr>
             <a:srgbClr val="A4A3A4"/>
@@ -305,7 +305,7 @@
             <a:fld id="{E90ED720-0104-4369-84BC-D37694168613}" type="datetimeFigureOut">
               <a:rPr kumimoji="1" lang="ja-JP" altLang="en-US" smtClean="0"/>
               <a:pPr/>
-              <a:t>2015/12/18</a:t>
+              <a:t>2016/1/6</a:t>
             </a:fld>
             <a:endParaRPr kumimoji="1" lang="ja-JP" altLang="en-US"/>
           </a:p>
@@ -504,7 +504,7 @@
             <a:fld id="{E90ED720-0104-4369-84BC-D37694168613}" type="datetimeFigureOut">
               <a:rPr kumimoji="1" lang="ja-JP" altLang="en-US" smtClean="0"/>
               <a:pPr/>
-              <a:t>2015/12/18</a:t>
+              <a:t>2016/1/6</a:t>
             </a:fld>
             <a:endParaRPr kumimoji="1" lang="ja-JP" altLang="en-US"/>
           </a:p>
@@ -713,7 +713,7 @@
             <a:fld id="{E90ED720-0104-4369-84BC-D37694168613}" type="datetimeFigureOut">
               <a:rPr kumimoji="1" lang="ja-JP" altLang="en-US" smtClean="0"/>
               <a:pPr/>
-              <a:t>2015/12/18</a:t>
+              <a:t>2016/1/6</a:t>
             </a:fld>
             <a:endParaRPr kumimoji="1" lang="ja-JP" altLang="en-US"/>
           </a:p>
@@ -912,7 +912,7 @@
             <a:fld id="{E90ED720-0104-4369-84BC-D37694168613}" type="datetimeFigureOut">
               <a:rPr kumimoji="1" lang="ja-JP" altLang="en-US" smtClean="0"/>
               <a:pPr/>
-              <a:t>2015/12/18</a:t>
+              <a:t>2016/1/6</a:t>
             </a:fld>
             <a:endParaRPr kumimoji="1" lang="ja-JP" altLang="en-US"/>
           </a:p>
@@ -1155,7 +1155,7 @@
             <a:fld id="{E90ED720-0104-4369-84BC-D37694168613}" type="datetimeFigureOut">
               <a:rPr kumimoji="1" lang="ja-JP" altLang="en-US" smtClean="0"/>
               <a:pPr/>
-              <a:t>2015/12/18</a:t>
+              <a:t>2016/1/6</a:t>
             </a:fld>
             <a:endParaRPr kumimoji="1" lang="ja-JP" altLang="en-US"/>
           </a:p>
@@ -1504,7 +1504,7 @@
             <a:fld id="{E90ED720-0104-4369-84BC-D37694168613}" type="datetimeFigureOut">
               <a:rPr kumimoji="1" lang="ja-JP" altLang="en-US" smtClean="0"/>
               <a:pPr/>
-              <a:t>2015/12/18</a:t>
+              <a:t>2016/1/6</a:t>
             </a:fld>
             <a:endParaRPr kumimoji="1" lang="ja-JP" altLang="en-US"/>
           </a:p>
@@ -1987,7 +1987,7 @@
             <a:fld id="{E90ED720-0104-4369-84BC-D37694168613}" type="datetimeFigureOut">
               <a:rPr kumimoji="1" lang="ja-JP" altLang="en-US" smtClean="0"/>
               <a:pPr/>
-              <a:t>2015/12/18</a:t>
+              <a:t>2016/1/6</a:t>
             </a:fld>
             <a:endParaRPr kumimoji="1" lang="ja-JP" altLang="en-US"/>
           </a:p>
@@ -2102,7 +2102,7 @@
             <a:fld id="{E90ED720-0104-4369-84BC-D37694168613}" type="datetimeFigureOut">
               <a:rPr kumimoji="1" lang="ja-JP" altLang="en-US" smtClean="0"/>
               <a:pPr/>
-              <a:t>2015/12/18</a:t>
+              <a:t>2016/1/6</a:t>
             </a:fld>
             <a:endParaRPr kumimoji="1" lang="ja-JP" altLang="en-US"/>
           </a:p>
@@ -2194,7 +2194,7 @@
             <a:fld id="{E90ED720-0104-4369-84BC-D37694168613}" type="datetimeFigureOut">
               <a:rPr kumimoji="1" lang="ja-JP" altLang="en-US" smtClean="0"/>
               <a:pPr/>
-              <a:t>2015/12/18</a:t>
+              <a:t>2016/1/6</a:t>
             </a:fld>
             <a:endParaRPr kumimoji="1" lang="ja-JP" altLang="en-US"/>
           </a:p>
@@ -2500,7 +2500,7 @@
             <a:fld id="{E90ED720-0104-4369-84BC-D37694168613}" type="datetimeFigureOut">
               <a:rPr kumimoji="1" lang="ja-JP" altLang="en-US" smtClean="0"/>
               <a:pPr/>
-              <a:t>2015/12/18</a:t>
+              <a:t>2016/1/6</a:t>
             </a:fld>
             <a:endParaRPr kumimoji="1" lang="ja-JP" altLang="en-US"/>
           </a:p>
@@ -2750,7 +2750,7 @@
             <a:fld id="{E90ED720-0104-4369-84BC-D37694168613}" type="datetimeFigureOut">
               <a:rPr kumimoji="1" lang="ja-JP" altLang="en-US" smtClean="0"/>
               <a:pPr/>
-              <a:t>2015/12/18</a:t>
+              <a:t>2016/1/6</a:t>
             </a:fld>
             <a:endParaRPr kumimoji="1" lang="ja-JP" altLang="en-US"/>
           </a:p>
@@ -2992,7 +2992,7 @@
             <a:fld id="{E90ED720-0104-4369-84BC-D37694168613}" type="datetimeFigureOut">
               <a:rPr kumimoji="1" lang="ja-JP" altLang="en-US" smtClean="0"/>
               <a:pPr/>
-              <a:t>2015/12/18</a:t>
+              <a:t>2016/1/6</a:t>
             </a:fld>
             <a:endParaRPr kumimoji="1" lang="ja-JP" altLang="en-US"/>
           </a:p>
@@ -4481,7 +4481,7 @@
           </p:nvCxnSpPr>
           <p:spPr>
             <a:xfrm>
-              <a:off x="2713112" y="3006874"/>
+              <a:off x="2713112" y="3131840"/>
               <a:ext cx="1296144" cy="0"/>
             </a:xfrm>
             <a:prstGeom prst="straightConnector1">
@@ -4518,7 +4518,7 @@
           </p:nvSpPr>
           <p:spPr>
             <a:xfrm>
-              <a:off x="2815823" y="2762275"/>
+              <a:off x="2852936" y="2854841"/>
               <a:ext cx="902811" cy="276999"/>
             </a:xfrm>
             <a:prstGeom prst="rect">
@@ -4552,81 +4552,6 @@
             </a:p>
           </p:txBody>
         </p:sp>
-        <p:sp>
-          <p:nvSpPr>
-            <p:cNvPr id="90" name="テキスト ボックス 89"/>
-            <p:cNvSpPr txBox="1"/>
-            <p:nvPr/>
-          </p:nvSpPr>
-          <p:spPr>
-            <a:xfrm>
-              <a:off x="2958237" y="2987824"/>
-              <a:ext cx="902811" cy="276999"/>
-            </a:xfrm>
-            <a:prstGeom prst="rect">
-              <a:avLst/>
-            </a:prstGeom>
-            <a:noFill/>
-          </p:spPr>
-          <p:txBody>
-            <a:bodyPr wrap="none" rtlCol="0">
-              <a:spAutoFit/>
-            </a:bodyPr>
-            <a:lstStyle/>
-            <a:p>
-              <a:r>
-                <a:rPr kumimoji="1" lang="ja-JP" altLang="en-US" sz="1200" dirty="0" smtClean="0"/>
-                <a:t>３回目</a:t>
-              </a:r>
-              <a:r>
-                <a:rPr kumimoji="1" lang="en-US" altLang="ja-JP" sz="1200" dirty="0" smtClean="0"/>
-                <a:t>…</a:t>
-              </a:r>
-              <a:r>
-                <a:rPr kumimoji="1" lang="en-US" altLang="ja-JP" sz="1200" b="1" dirty="0" smtClean="0"/>
-                <a:t>NG</a:t>
-              </a:r>
-              <a:endParaRPr kumimoji="1" lang="ja-JP" altLang="en-US" sz="1200" b="1" dirty="0"/>
-            </a:p>
-          </p:txBody>
-        </p:sp>
-        <p:cxnSp>
-          <p:nvCxnSpPr>
-            <p:cNvPr id="91" name="直線矢印コネクタ 90"/>
-            <p:cNvCxnSpPr/>
-            <p:nvPr/>
-          </p:nvCxnSpPr>
-          <p:spPr>
-            <a:xfrm>
-              <a:off x="2708920" y="3222898"/>
-              <a:ext cx="1296144" cy="0"/>
-            </a:xfrm>
-            <a:prstGeom prst="straightConnector1">
-              <a:avLst/>
-            </a:prstGeom>
-            <a:ln w="15875">
-              <a:solidFill>
-                <a:schemeClr val="tx1"/>
-              </a:solidFill>
-              <a:prstDash val="sysDash"/>
-              <a:tailEnd type="arrow"/>
-            </a:ln>
-          </p:spPr>
-          <p:style>
-            <a:lnRef idx="1">
-              <a:schemeClr val="accent1"/>
-            </a:lnRef>
-            <a:fillRef idx="0">
-              <a:schemeClr val="accent1"/>
-            </a:fillRef>
-            <a:effectRef idx="0">
-              <a:schemeClr val="accent1"/>
-            </a:effectRef>
-            <a:fontRef idx="minor">
-              <a:schemeClr val="tx1"/>
-            </a:fontRef>
-          </p:style>
-        </p:cxnSp>
       </p:grpSp>
       <p:sp>
         <p:nvSpPr>
@@ -5017,7 +4942,7 @@
         </p:nvSpPr>
         <p:spPr>
           <a:xfrm>
-            <a:off x="2987427" y="2968774"/>
+            <a:off x="2903798" y="2843808"/>
             <a:ext cx="811138" cy="288032"/>
           </a:xfrm>
           <a:prstGeom prst="rect">
@@ -5064,7 +4989,7 @@
         <p:spPr>
           <a:xfrm>
             <a:off x="1700808" y="4006969"/>
-            <a:ext cx="2425664" cy="276999"/>
+            <a:ext cx="2398413" cy="276999"/>
           </a:xfrm>
           <a:prstGeom prst="rect">
             <a:avLst/>
@@ -5077,8 +5002,16 @@
           <a:lstStyle/>
           <a:p>
             <a:r>
+              <a:rPr lang="en-US" altLang="ja-JP" sz="1200" dirty="0"/>
+              <a:t>3</a:t>
+            </a:r>
+            <a:r>
               <a:rPr lang="ja-JP" altLang="en-US" sz="1200" dirty="0" smtClean="0"/>
-              <a:t>４回目のリトライで再接続に成功！</a:t>
+              <a:t>回目</a:t>
+            </a:r>
+            <a:r>
+              <a:rPr lang="ja-JP" altLang="en-US" sz="1200" dirty="0" smtClean="0"/>
+              <a:t>のリトライで再接続に成功！</a:t>
             </a:r>
             <a:endParaRPr lang="ja-JP" altLang="en-US" sz="1200" dirty="0"/>
           </a:p>

</xml_diff>